<commit_message>
add slides7w, cp&slides 7f
</commit_message>
<xml_diff>
--- a/restricted/slides7w.pptx
+++ b/restricted/slides7w.pptx
@@ -10461,11 +10461,7 @@
             </a:r>
             <a:r>
               <a:rPr lang="en-US" sz="4800" dirty="0" smtClean="0"/>
-              <a:t>) ::=</a:t>
-            </a:r>
-            <a:r>
-              <a:rPr lang="en-US" sz="4800" dirty="0" smtClean="0"/>
-              <a:t> (</a:t>
+              <a:t>) ::= (</a:t>
             </a:r>
             <a:r>
               <a:rPr lang="en-US" sz="4800" dirty="0" err="1" smtClean="0">
@@ -10508,7 +10504,6 @@
               <a:rPr lang="en-US" sz="4800" dirty="0" smtClean="0"/>
               <a:t>)</a:t>
             </a:r>
-            <a:endParaRPr lang="en-US" sz="4800" dirty="0" smtClean="0"/>
           </a:p>
         </p:txBody>
       </p:sp>
@@ -10612,14 +10607,7 @@
                 <a:latin typeface="Comic Sans MS" pitchFamily="66" charset="0"/>
                 <a:sym typeface="Euclid Symbol"/>
               </a:rPr>
-              <a:t>)</a:t>
-            </a:r>
-            <a:r>
-              <a:rPr lang="en-US" sz="5400" dirty="0" smtClean="0">
-                <a:latin typeface="Comic Sans MS" pitchFamily="66" charset="0"/>
-                <a:sym typeface="Euclid Symbol"/>
-              </a:rPr>
-              <a:t>:</a:t>
+              <a:t>):</a:t>
             </a:r>
             <a:endParaRPr lang="en-US" sz="5400" dirty="0" smtClean="0">
               <a:latin typeface="Comic Sans MS" pitchFamily="66" charset="0"/>
@@ -46457,13 +46445,13 @@
               <a:buNone/>
             </a:pPr>
             <a:r>
-              <a:rPr lang="en-US" sz="11500" dirty="0" smtClean="0">
+              <a:rPr lang="en-US" sz="11500" smtClean="0">
                 <a:sym typeface="Euclid Symbol"/>
               </a:rPr>
               <a:t>1</a:t>
             </a:r>
             <a:r>
-              <a:rPr lang="en-US" sz="11500" dirty="0" smtClean="0">
+              <a:rPr lang="en-US" sz="11500" smtClean="0">
                 <a:latin typeface="Euclid Symbol" charset="2"/>
                 <a:cs typeface="Euclid Symbol" charset="2"/>
                 <a:sym typeface="Symbol"/>
@@ -46471,10 +46459,10 @@
               <a:t>-</a:t>
             </a:r>
             <a:r>
-              <a:rPr lang="en-US" sz="11500" dirty="0" smtClean="0">
+              <a:rPr lang="en-US" sz="11500" smtClean="0">
                 <a:sym typeface="Euclid Symbol"/>
               </a:rPr>
-              <a:t>4</a:t>
+              <a:t>3</a:t>
             </a:r>
             <a:endParaRPr lang="en-US" sz="12700" dirty="0" smtClean="0"/>
           </a:p>

</xml_diff>

<commit_message>
small edits: slides&cp7w, recursive data
</commit_message>
<xml_diff>
--- a/restricted/slides7w.pptx
+++ b/restricted/slides7w.pptx
@@ -36,9 +36,9 @@
     <p:sldId id="708" r:id="rId24"/>
     <p:sldId id="697" r:id="rId25"/>
     <p:sldId id="669" r:id="rId26"/>
-    <p:sldId id="721" r:id="rId27"/>
-    <p:sldId id="750" r:id="rId28"/>
-    <p:sldId id="722" r:id="rId29"/>
+    <p:sldId id="750" r:id="rId27"/>
+    <p:sldId id="722" r:id="rId28"/>
+    <p:sldId id="721" r:id="rId29"/>
     <p:sldId id="751" r:id="rId30"/>
     <p:sldId id="752" r:id="rId31"/>
     <p:sldId id="753" r:id="rId32"/>
@@ -18214,7 +18214,7 @@
 </file>
 
 <file path=ppt/slides/slide25.xml><?xml version="1.0" encoding="utf-8"?>
-<p:sld xmlns:a="http://schemas.openxmlformats.org/drawingml/2006/main" xmlns:r="http://schemas.openxmlformats.org/officeDocument/2006/relationships" xmlns:mc="http://schemas.openxmlformats.org/markup-compatibility/2006" xmlns:mv="urn:schemas-microsoft-com:mac:vml" xmlns:p="http://schemas.openxmlformats.org/presentationml/2006/main" mc:Ignorable="mv" mc:PreserveAttributes="mv:*">
+<p:sld xmlns:a="http://schemas.openxmlformats.org/drawingml/2006/main" xmlns:r="http://schemas.openxmlformats.org/officeDocument/2006/relationships" xmlns:mc="http://schemas.openxmlformats.org/markup-compatibility/2006" xmlns:mv="urn:schemas-microsoft-com:mac:vml" xmlns:p="http://schemas.openxmlformats.org/presentationml/2006/main" mc:Ignorable="mv" mc:PreserveAttributes="mv:*" show="0">
   <p:cSld>
     <p:spTree>
       <p:nvGrpSpPr>
@@ -18349,270 +18349,6 @@
       </p:grpSpPr>
       <p:sp>
         <p:nvSpPr>
-          <p:cNvPr id="39938" name="Title 1"/>
-          <p:cNvSpPr>
-            <a:spLocks noGrp="1"/>
-          </p:cNvSpPr>
-          <p:nvPr>
-            <p:ph type="title"/>
-          </p:nvPr>
-        </p:nvSpPr>
-        <p:spPr/>
-        <p:txBody>
-          <a:bodyPr/>
-          <a:lstStyle/>
-          <a:p>
-            <a:r>
-              <a:rPr lang="en-US" sz="4400" dirty="0" smtClean="0"/>
-              <a:t>recursive functions</a:t>
-            </a:r>
-          </a:p>
-        </p:txBody>
-      </p:sp>
-      <p:sp>
-        <p:nvSpPr>
-          <p:cNvPr id="39939" name="Content Placeholder 2"/>
-          <p:cNvSpPr>
-            <a:spLocks noGrp="1"/>
-          </p:cNvSpPr>
-          <p:nvPr>
-            <p:ph idx="1"/>
-          </p:nvPr>
-        </p:nvSpPr>
-        <p:spPr>
-          <a:xfrm>
-            <a:off x="228600" y="1752600"/>
-            <a:ext cx="8686800" cy="3352800"/>
-          </a:xfrm>
-        </p:spPr>
-        <p:txBody>
-          <a:bodyPr/>
-          <a:lstStyle/>
-          <a:p>
-            <a:pPr>
-              <a:buFontTx/>
-              <a:buNone/>
-            </a:pPr>
-            <a:r>
-              <a:rPr lang="en-US" sz="4800" dirty="0" smtClean="0">
-                <a:solidFill>
-                  <a:srgbClr val="0000FF"/>
-                </a:solidFill>
-              </a:rPr>
-              <a:t>f</a:t>
-            </a:r>
-            <a:r>
-              <a:rPr lang="en-US" sz="4800" dirty="0" smtClean="0"/>
-              <a:t>: Data → Values</a:t>
-            </a:r>
-          </a:p>
-          <a:p>
-            <a:pPr>
-              <a:buFontTx/>
-              <a:buNone/>
-            </a:pPr>
-            <a:r>
-              <a:rPr lang="en-US" sz="4800" dirty="0" smtClean="0">
-                <a:solidFill>
-                  <a:srgbClr val="0000FF"/>
-                </a:solidFill>
-              </a:rPr>
-              <a:t>f</a:t>
-            </a:r>
-            <a:r>
-              <a:rPr lang="en-US" sz="4800" dirty="0" smtClean="0"/>
-              <a:t>(</a:t>
-            </a:r>
-            <a:r>
-              <a:rPr lang="en-US" sz="4800" dirty="0" smtClean="0">
-                <a:solidFill>
-                  <a:srgbClr val="0000FF"/>
-                </a:solidFill>
-              </a:rPr>
-              <a:t>b</a:t>
-            </a:r>
-            <a:r>
-              <a:rPr lang="en-US" sz="4800" dirty="0" smtClean="0"/>
-              <a:t>) </a:t>
-            </a:r>
-            <a:r>
-              <a:rPr lang="en-US" sz="4800" dirty="0" err="1" smtClean="0"/>
-              <a:t>def’d</a:t>
-            </a:r>
-            <a:r>
-              <a:rPr lang="en-US" sz="4800" dirty="0" smtClean="0"/>
-              <a:t> directly for base </a:t>
-            </a:r>
-            <a:r>
-              <a:rPr lang="en-US" sz="4800" dirty="0" smtClean="0">
-                <a:solidFill>
-                  <a:srgbClr val="0000FF"/>
-                </a:solidFill>
-              </a:rPr>
-              <a:t>b</a:t>
-            </a:r>
-          </a:p>
-          <a:p>
-            <a:pPr>
-              <a:buFontTx/>
-              <a:buNone/>
-            </a:pPr>
-            <a:r>
-              <a:rPr lang="en-US" sz="4800" dirty="0" smtClean="0">
-                <a:solidFill>
-                  <a:srgbClr val="0000FF"/>
-                </a:solidFill>
-              </a:rPr>
-              <a:t>f</a:t>
-            </a:r>
-            <a:r>
-              <a:rPr lang="en-US" sz="4800" dirty="0" smtClean="0"/>
-              <a:t>(</a:t>
-            </a:r>
-            <a:r>
-              <a:rPr lang="en-US" sz="4800" dirty="0" err="1" smtClean="0">
-                <a:solidFill>
-                  <a:srgbClr val="0000FF"/>
-                </a:solidFill>
-              </a:rPr>
-              <a:t>cnstr</a:t>
-            </a:r>
-            <a:r>
-              <a:rPr lang="en-US" sz="4800" dirty="0" smtClean="0"/>
-              <a:t>(</a:t>
-            </a:r>
-            <a:r>
-              <a:rPr lang="en-US" sz="4800" dirty="0" smtClean="0">
-                <a:solidFill>
-                  <a:srgbClr val="0000FF"/>
-                </a:solidFill>
-              </a:rPr>
-              <a:t>x</a:t>
-            </a:r>
-            <a:r>
-              <a:rPr lang="en-US" sz="4800" dirty="0" smtClean="0"/>
-              <a:t>)) </a:t>
-            </a:r>
-            <a:r>
-              <a:rPr lang="en-US" sz="4800" dirty="0" err="1" smtClean="0"/>
-              <a:t>def’d</a:t>
-            </a:r>
-            <a:r>
-              <a:rPr lang="en-US" sz="4800" dirty="0" smtClean="0"/>
-              <a:t> using </a:t>
-            </a:r>
-            <a:r>
-              <a:rPr lang="en-US" sz="4800" dirty="0" smtClean="0">
-                <a:solidFill>
-                  <a:srgbClr val="0000FF"/>
-                </a:solidFill>
-              </a:rPr>
-              <a:t>f</a:t>
-            </a:r>
-            <a:r>
-              <a:rPr lang="en-US" sz="4800" dirty="0" smtClean="0"/>
-              <a:t>(</a:t>
-            </a:r>
-            <a:r>
-              <a:rPr lang="en-US" sz="4800" dirty="0" smtClean="0">
-                <a:solidFill>
-                  <a:srgbClr val="0000FF"/>
-                </a:solidFill>
-              </a:rPr>
-              <a:t>x</a:t>
-            </a:r>
-            <a:r>
-              <a:rPr lang="en-US" sz="4800" dirty="0" smtClean="0"/>
-              <a:t>), </a:t>
-            </a:r>
-            <a:r>
-              <a:rPr lang="en-US" sz="4800" dirty="0" smtClean="0">
-                <a:solidFill>
-                  <a:srgbClr val="0000FF"/>
-                </a:solidFill>
-              </a:rPr>
-              <a:t>x</a:t>
-            </a:r>
-          </a:p>
-        </p:txBody>
-      </p:sp>
-      <p:sp>
-        <p:nvSpPr>
-          <p:cNvPr id="39940" name="Slide Number Placeholder 3"/>
-          <p:cNvSpPr>
-            <a:spLocks noGrp="1"/>
-          </p:cNvSpPr>
-          <p:nvPr>
-            <p:ph type="sldNum" sz="quarter" idx="4"/>
-          </p:nvPr>
-        </p:nvSpPr>
-        <p:spPr bwMode="auto">
-          <a:xfrm>
-            <a:off x="8153400" y="6629399"/>
-            <a:ext cx="990600" cy="228601"/>
-          </a:xfrm>
-          <a:noFill/>
-          <a:ln>
-            <a:miter lim="800000"/>
-            <a:headEnd/>
-            <a:tailEnd/>
-          </a:ln>
-        </p:spPr>
-        <p:txBody>
-          <a:bodyPr wrap="square" numCol="1" anchorCtr="0" compatLnSpc="1">
-            <a:prstTxWarp prst="textNoShape">
-              <a:avLst/>
-            </a:prstTxWarp>
-          </a:bodyPr>
-          <a:lstStyle/>
-          <a:p>
-            <a:r>
-              <a:rPr lang="en-US" dirty="0" smtClean="0"/>
-              <a:t>7W.</a:t>
-            </a:r>
-            <a:fld id="{07EB1CE8-A0AE-4CF6-8B95-C1E0756CCC63}" type="slidenum">
-              <a:rPr lang="en-US" smtClean="0"/>
-              <a:pPr/>
-              <a:t>26</a:t>
-            </a:fld>
-            <a:endParaRPr lang="en-US" dirty="0" smtClean="0"/>
-          </a:p>
-        </p:txBody>
-      </p:sp>
-    </p:spTree>
-  </p:cSld>
-  <p:clrMapOvr>
-    <a:masterClrMapping/>
-  </p:clrMapOvr>
-  <p:timing>
-    <p:tnLst>
-      <p:par>
-        <p:cTn id="1" dur="indefinite" restart="never" nodeType="tmRoot"/>
-      </p:par>
-    </p:tnLst>
-  </p:timing>
-</p:sld>
-</file>
-
-<file path=ppt/slides/slide27.xml><?xml version="1.0" encoding="utf-8"?>
-<p:sld xmlns:a="http://schemas.openxmlformats.org/drawingml/2006/main" xmlns:r="http://schemas.openxmlformats.org/officeDocument/2006/relationships" xmlns:mc="http://schemas.openxmlformats.org/markup-compatibility/2006" xmlns:mv="urn:schemas-microsoft-com:mac:vml" xmlns:p="http://schemas.openxmlformats.org/presentationml/2006/main" mc:Ignorable="mv" mc:PreserveAttributes="mv:*">
-  <p:cSld>
-    <p:spTree>
-      <p:nvGrpSpPr>
-        <p:cNvPr id="1" name=""/>
-        <p:cNvGrpSpPr/>
-        <p:nvPr/>
-      </p:nvGrpSpPr>
-      <p:grpSpPr>
-        <a:xfrm>
-          <a:off x="0" y="0"/>
-          <a:ext cx="0" cy="0"/>
-          <a:chOff x="0" y="0"/>
-          <a:chExt cx="0" cy="0"/>
-        </a:xfrm>
-      </p:grpSpPr>
-      <p:sp>
-        <p:nvSpPr>
           <p:cNvPr id="2" name="Title 1"/>
           <p:cNvSpPr>
             <a:spLocks noGrp="1"/>
@@ -18941,7 +18677,7 @@
               <a:pPr>
                 <a:defRPr/>
               </a:pPr>
-              <a:t>27</a:t>
+              <a:t>26</a:t>
             </a:fld>
             <a:endParaRPr lang="en-US" dirty="0"/>
           </a:p>
@@ -19235,7 +18971,7 @@
 </p:sld>
 </file>
 
-<file path=ppt/slides/slide28.xml><?xml version="1.0" encoding="utf-8"?>
+<file path=ppt/slides/slide27.xml><?xml version="1.0" encoding="utf-8"?>
 <p:sld xmlns:a="http://schemas.openxmlformats.org/drawingml/2006/main" xmlns:r="http://schemas.openxmlformats.org/officeDocument/2006/relationships" xmlns:mc="http://schemas.openxmlformats.org/markup-compatibility/2006" xmlns:mv="urn:schemas-microsoft-com:mac:vml" xmlns:p="http://schemas.openxmlformats.org/presentationml/2006/main" mc:Ignorable="mv" mc:PreserveAttributes="mv:*">
   <p:cSld>
     <p:spTree>
@@ -19262,14 +18998,41 @@
             <p:ph type="title"/>
           </p:nvPr>
         </p:nvSpPr>
-        <p:spPr/>
+        <p:spPr>
+          <a:xfrm>
+            <a:off x="838200" y="0"/>
+            <a:ext cx="7696200" cy="1066800"/>
+          </a:xfrm>
+        </p:spPr>
         <p:txBody>
           <a:bodyPr/>
           <a:lstStyle/>
           <a:p>
             <a:r>
+              <a:rPr lang="en-US" dirty="0" err="1" smtClean="0"/>
+              <a:t>k</a:t>
+            </a:r>
+            <a:r>
+              <a:rPr lang="en-US" baseline="30000" dirty="0" err="1" smtClean="0">
+                <a:solidFill>
+                  <a:schemeClr val="accent1">
+                    <a:lumMod val="50000"/>
+                  </a:schemeClr>
+                </a:solidFill>
+              </a:rPr>
+              <a:t>n</a:t>
+            </a:r>
+            <a:r>
+              <a:rPr lang="en-US" baseline="30000" dirty="0" smtClean="0"/>
+              <a:t>   </a:t>
+            </a:r>
+            <a:r>
               <a:rPr lang="en-US" dirty="0" smtClean="0"/>
-              <a:t>recursive function on </a:t>
+              <a:t>⎯ recursive </a:t>
+            </a:r>
+            <a:r>
+              <a:rPr lang="en-US" dirty="0" smtClean="0"/>
+              <a:t>function on </a:t>
             </a:r>
             <a:r>
               <a:rPr lang="en-US" sz="4400" dirty="0" smtClean="0">
@@ -19323,7 +19086,19 @@
             </a:r>
             <a:r>
               <a:rPr lang="en-US" sz="4800" dirty="0" smtClean="0"/>
-              <a:t>, 0)    ::= 1</a:t>
+              <a:t>, </a:t>
+            </a:r>
+            <a:r>
+              <a:rPr lang="en-US" sz="4800" dirty="0" smtClean="0">
+                <a:solidFill>
+                  <a:srgbClr val="0000E5"/>
+                </a:solidFill>
+              </a:rPr>
+              <a:t>0</a:t>
+            </a:r>
+            <a:r>
+              <a:rPr lang="en-US" sz="4800" dirty="0" smtClean="0"/>
+              <a:t>)    ::= 1</a:t>
             </a:r>
           </a:p>
           <a:p>
@@ -19333,7 +19108,19 @@
             </a:r>
             <a:r>
               <a:rPr lang="en-US" sz="4800" dirty="0" smtClean="0"/>
-              <a:t>, n+1) ::= </a:t>
+              <a:t>, </a:t>
+            </a:r>
+            <a:r>
+              <a:rPr lang="en-US" sz="4800" dirty="0" smtClean="0">
+                <a:solidFill>
+                  <a:srgbClr val="0000E5"/>
+                </a:solidFill>
+              </a:rPr>
+              <a:t>n+1</a:t>
+            </a:r>
+            <a:r>
+              <a:rPr lang="en-US" sz="4800" dirty="0" smtClean="0"/>
+              <a:t>) ::= </a:t>
             </a:r>
             <a:r>
               <a:rPr lang="en-US" sz="4800" dirty="0" err="1" smtClean="0"/>
@@ -19347,7 +19134,15 @@
             </a:r>
             <a:r>
               <a:rPr lang="en-US" sz="4800" dirty="0" err="1" smtClean="0"/>
-              <a:t>expt(k,n</a:t>
+              <a:t>expt(k,</a:t>
+            </a:r>
+            <a:r>
+              <a:rPr lang="en-US" sz="4800" dirty="0" err="1" smtClean="0">
+                <a:solidFill>
+                  <a:srgbClr val="0000E5"/>
+                </a:solidFill>
+              </a:rPr>
+              <a:t>n</a:t>
             </a:r>
             <a:r>
               <a:rPr lang="en-US" sz="4800" dirty="0" smtClean="0"/>
@@ -19604,7 +19399,7 @@
             <a:fld id="{70021F31-2A9B-4256-9023-4F49A0CC1177}" type="slidenum">
               <a:rPr lang="en-US" smtClean="0"/>
               <a:pPr/>
-              <a:t>28</a:t>
+              <a:t>27</a:t>
             </a:fld>
             <a:endParaRPr lang="en-US" dirty="0" smtClean="0"/>
           </a:p>
@@ -19615,7 +19410,7 @@
   <p:clrMapOvr>
     <a:masterClrMapping/>
   </p:clrMapOvr>
-  <p:transition>
+  <p:transition spd="slow">
     <p:fade thruBlk="1"/>
   </p:transition>
   <p:timing>
@@ -19639,7 +19434,7 @@
                             </p:stCondLst>
                             <p:childTnLst>
                               <p:par>
-                                <p:cTn id="5" presetID="1" presetClass="entr" presetSubtype="0" fill="hold" nodeType="clickEffect">
+                                <p:cTn id="5" presetID="1" presetClass="entr" presetSubtype="0" fill="hold" grpId="1" nodeType="clickEffect">
                                   <p:stCondLst>
                                     <p:cond delay="0"/>
                                   </p:stCondLst>
@@ -19654,7 +19449,7 @@
                                         <p:tgtEl>
                                           <p:spTgt spid="3">
                                             <p:txEl>
-                                              <p:pRg st="2" end="2"/>
+                                              <p:pRg st="0" end="0"/>
                                             </p:txEl>
                                           </p:spTgt>
                                         </p:tgtEl>
@@ -19688,7 +19483,7 @@
                             </p:stCondLst>
                             <p:childTnLst>
                               <p:par>
-                                <p:cTn id="9" presetID="1" presetClass="entr" presetSubtype="0" fill="hold" nodeType="clickEffect">
+                                <p:cTn id="9" presetID="10" presetClass="entr" presetSubtype="0" fill="hold" grpId="0" nodeType="clickEffect">
                                   <p:stCondLst>
                                     <p:cond delay="0"/>
                                   </p:stCondLst>
@@ -19696,6 +19491,119 @@
                                     <p:set>
                                       <p:cBhvr>
                                         <p:cTn id="10" dur="1" fill="hold">
+                                          <p:stCondLst>
+                                            <p:cond delay="0"/>
+                                          </p:stCondLst>
+                                        </p:cTn>
+                                        <p:tgtEl>
+                                          <p:spTgt spid="3">
+                                            <p:txEl>
+                                              <p:pRg st="1" end="1"/>
+                                            </p:txEl>
+                                          </p:spTgt>
+                                        </p:tgtEl>
+                                        <p:attrNameLst>
+                                          <p:attrName>style.visibility</p:attrName>
+                                        </p:attrNameLst>
+                                      </p:cBhvr>
+                                      <p:to>
+                                        <p:strVal val="visible"/>
+                                      </p:to>
+                                    </p:set>
+                                    <p:animEffect transition="in" filter="fade">
+                                      <p:cBhvr>
+                                        <p:cTn id="11" dur="1000"/>
+                                        <p:tgtEl>
+                                          <p:spTgt spid="3">
+                                            <p:txEl>
+                                              <p:pRg st="1" end="1"/>
+                                            </p:txEl>
+                                          </p:spTgt>
+                                        </p:tgtEl>
+                                      </p:cBhvr>
+                                    </p:animEffect>
+                                  </p:childTnLst>
+                                </p:cTn>
+                              </p:par>
+                            </p:childTnLst>
+                          </p:cTn>
+                        </p:par>
+                      </p:childTnLst>
+                    </p:cTn>
+                  </p:par>
+                  <p:par>
+                    <p:cTn id="12" fill="hold">
+                      <p:stCondLst>
+                        <p:cond delay="indefinite"/>
+                      </p:stCondLst>
+                      <p:childTnLst>
+                        <p:par>
+                          <p:cTn id="13" fill="hold">
+                            <p:stCondLst>
+                              <p:cond delay="0"/>
+                            </p:stCondLst>
+                            <p:childTnLst>
+                              <p:par>
+                                <p:cTn id="14" presetID="10" presetClass="entr" presetSubtype="0" fill="hold" grpId="0" nodeType="clickEffect">
+                                  <p:stCondLst>
+                                    <p:cond delay="0"/>
+                                  </p:stCondLst>
+                                  <p:childTnLst>
+                                    <p:set>
+                                      <p:cBhvr>
+                                        <p:cTn id="15" dur="1" fill="hold">
+                                          <p:stCondLst>
+                                            <p:cond delay="0"/>
+                                          </p:stCondLst>
+                                        </p:cTn>
+                                        <p:tgtEl>
+                                          <p:spTgt spid="3">
+                                            <p:txEl>
+                                              <p:pRg st="2" end="2"/>
+                                            </p:txEl>
+                                          </p:spTgt>
+                                        </p:tgtEl>
+                                        <p:attrNameLst>
+                                          <p:attrName>style.visibility</p:attrName>
+                                        </p:attrNameLst>
+                                      </p:cBhvr>
+                                      <p:to>
+                                        <p:strVal val="visible"/>
+                                      </p:to>
+                                    </p:set>
+                                    <p:animEffect transition="in" filter="fade">
+                                      <p:cBhvr>
+                                        <p:cTn id="16" dur="500"/>
+                                        <p:tgtEl>
+                                          <p:spTgt spid="3">
+                                            <p:txEl>
+                                              <p:pRg st="2" end="2"/>
+                                            </p:txEl>
+                                          </p:spTgt>
+                                        </p:tgtEl>
+                                      </p:cBhvr>
+                                    </p:animEffect>
+                                  </p:childTnLst>
+                                </p:cTn>
+                              </p:par>
+                            </p:childTnLst>
+                          </p:cTn>
+                        </p:par>
+                        <p:par>
+                          <p:cTn id="17" fill="hold">
+                            <p:stCondLst>
+                              <p:cond delay="500"/>
+                            </p:stCondLst>
+                            <p:childTnLst>
+                              <p:par>
+                                <p:cTn id="18" presetID="10" presetClass="entr" presetSubtype="0" fill="hold" grpId="0" nodeType="afterEffect">
+                                  <p:stCondLst>
+                                    <p:cond delay="0"/>
+                                  </p:stCondLst>
+                                  <p:childTnLst>
+                                    <p:set>
+                                      <p:cBhvr>
+                                        <p:cTn id="19" dur="1" fill="hold">
                                           <p:stCondLst>
                                             <p:cond delay="0"/>
                                           </p:stCondLst>
@@ -19715,18 +19623,48 @@
                                         <p:strVal val="visible"/>
                                       </p:to>
                                     </p:set>
+                                    <p:animEffect transition="in" filter="fade">
+                                      <p:cBhvr>
+                                        <p:cTn id="20" dur="500"/>
+                                        <p:tgtEl>
+                                          <p:spTgt spid="3">
+                                            <p:txEl>
+                                              <p:pRg st="3" end="3"/>
+                                            </p:txEl>
+                                          </p:spTgt>
+                                        </p:tgtEl>
+                                      </p:cBhvr>
+                                    </p:animEffect>
                                   </p:childTnLst>
                                 </p:cTn>
                               </p:par>
+                            </p:childTnLst>
+                          </p:cTn>
+                        </p:par>
+                      </p:childTnLst>
+                    </p:cTn>
+                  </p:par>
+                  <p:par>
+                    <p:cTn id="21" fill="hold">
+                      <p:stCondLst>
+                        <p:cond delay="indefinite"/>
+                      </p:stCondLst>
+                      <p:childTnLst>
+                        <p:par>
+                          <p:cTn id="22" fill="hold">
+                            <p:stCondLst>
+                              <p:cond delay="0"/>
+                            </p:stCondLst>
+                            <p:childTnLst>
                               <p:par>
-                                <p:cTn id="11" presetID="1" presetClass="entr" presetSubtype="0" fill="hold" nodeType="withEffect">
+                                <p:cTn id="23" presetID="10" presetClass="entr" presetSubtype="0" fill="hold" grpId="0" nodeType="clickEffect">
                                   <p:stCondLst>
                                     <p:cond delay="0"/>
                                   </p:stCondLst>
                                   <p:childTnLst>
                                     <p:set>
                                       <p:cBhvr>
-                                        <p:cTn id="12" dur="1" fill="hold">
+                                        <p:cTn id="24" dur="1" fill="hold">
                                           <p:stCondLst>
                                             <p:cond delay="0"/>
                                           </p:stCondLst>
@@ -19746,6 +19684,18 @@
                                         <p:strVal val="visible"/>
                                       </p:to>
                                     </p:set>
+                                    <p:animEffect transition="in" filter="fade">
+                                      <p:cBhvr>
+                                        <p:cTn id="25" dur="1000"/>
+                                        <p:tgtEl>
+                                          <p:spTgt spid="3">
+                                            <p:txEl>
+                                              <p:pRg st="4" end="4"/>
+                                            </p:txEl>
+                                          </p:spTgt>
+                                        </p:tgtEl>
+                                      </p:cBhvr>
+                                    </p:animEffect>
                                   </p:childTnLst>
                                 </p:cTn>
                               </p:par>
@@ -19776,6 +19726,426 @@
         </p:cTn>
       </p:par>
     </p:tnLst>
+    <p:bldLst>
+      <p:bldP spid="3" grpId="0" build="p"/>
+      <p:bldP spid="3" grpId="1" uiExpand="1" build="p"/>
+    </p:bldLst>
+  </p:timing>
+</p:sld>
+</file>
+
+<file path=ppt/slides/slide28.xml><?xml version="1.0" encoding="utf-8"?>
+<p:sld xmlns:a="http://schemas.openxmlformats.org/drawingml/2006/main" xmlns:r="http://schemas.openxmlformats.org/officeDocument/2006/relationships" xmlns:mc="http://schemas.openxmlformats.org/markup-compatibility/2006" xmlns:mv="urn:schemas-microsoft-com:mac:vml" xmlns:p="http://schemas.openxmlformats.org/presentationml/2006/main" mc:Ignorable="mv" mc:PreserveAttributes="mv:*">
+  <p:cSld>
+    <p:spTree>
+      <p:nvGrpSpPr>
+        <p:cNvPr id="1" name=""/>
+        <p:cNvGrpSpPr/>
+        <p:nvPr/>
+      </p:nvGrpSpPr>
+      <p:grpSpPr>
+        <a:xfrm>
+          <a:off x="0" y="0"/>
+          <a:ext cx="0" cy="0"/>
+          <a:chOff x="0" y="0"/>
+          <a:chExt cx="0" cy="0"/>
+        </a:xfrm>
+      </p:grpSpPr>
+      <p:sp>
+        <p:nvSpPr>
+          <p:cNvPr id="39938" name="Title 1"/>
+          <p:cNvSpPr>
+            <a:spLocks noGrp="1"/>
+          </p:cNvSpPr>
+          <p:nvPr>
+            <p:ph type="title"/>
+          </p:nvPr>
+        </p:nvSpPr>
+        <p:spPr/>
+        <p:txBody>
+          <a:bodyPr/>
+          <a:lstStyle/>
+          <a:p>
+            <a:r>
+              <a:rPr lang="en-US" sz="4400" dirty="0" smtClean="0"/>
+              <a:t>Recursive Functions</a:t>
+            </a:r>
+            <a:endParaRPr lang="en-US" sz="4400" dirty="0" smtClean="0"/>
+          </a:p>
+        </p:txBody>
+      </p:sp>
+      <p:sp>
+        <p:nvSpPr>
+          <p:cNvPr id="39939" name="Content Placeholder 2"/>
+          <p:cNvSpPr>
+            <a:spLocks noGrp="1"/>
+          </p:cNvSpPr>
+          <p:nvPr>
+            <p:ph idx="1"/>
+          </p:nvPr>
+        </p:nvSpPr>
+        <p:spPr>
+          <a:xfrm>
+            <a:off x="228600" y="1752600"/>
+            <a:ext cx="8686800" cy="3352800"/>
+          </a:xfrm>
+        </p:spPr>
+        <p:txBody>
+          <a:bodyPr/>
+          <a:lstStyle/>
+          <a:p>
+            <a:pPr>
+              <a:buFontTx/>
+              <a:buNone/>
+            </a:pPr>
+            <a:r>
+              <a:rPr lang="en-US" sz="4800" dirty="0" smtClean="0">
+                <a:solidFill>
+                  <a:srgbClr val="0000FF"/>
+                </a:solidFill>
+              </a:rPr>
+              <a:t>f</a:t>
+            </a:r>
+            <a:r>
+              <a:rPr lang="en-US" sz="4800" dirty="0" smtClean="0"/>
+              <a:t>: Data → Values</a:t>
+            </a:r>
+          </a:p>
+          <a:p>
+            <a:pPr>
+              <a:buFontTx/>
+              <a:buNone/>
+            </a:pPr>
+            <a:r>
+              <a:rPr lang="en-US" sz="4800" dirty="0" smtClean="0">
+                <a:solidFill>
+                  <a:srgbClr val="0000FF"/>
+                </a:solidFill>
+              </a:rPr>
+              <a:t>f</a:t>
+            </a:r>
+            <a:r>
+              <a:rPr lang="en-US" sz="4800" dirty="0" smtClean="0"/>
+              <a:t>(</a:t>
+            </a:r>
+            <a:r>
+              <a:rPr lang="en-US" sz="4800" dirty="0" smtClean="0">
+                <a:solidFill>
+                  <a:srgbClr val="0000FF"/>
+                </a:solidFill>
+              </a:rPr>
+              <a:t>b</a:t>
+            </a:r>
+            <a:r>
+              <a:rPr lang="en-US" sz="4800" dirty="0" smtClean="0"/>
+              <a:t>) </a:t>
+            </a:r>
+            <a:r>
+              <a:rPr lang="en-US" sz="4800" dirty="0" err="1" smtClean="0"/>
+              <a:t>def’d</a:t>
+            </a:r>
+            <a:r>
+              <a:rPr lang="en-US" sz="4800" dirty="0" smtClean="0"/>
+              <a:t> directly for base </a:t>
+            </a:r>
+            <a:r>
+              <a:rPr lang="en-US" sz="4800" dirty="0" smtClean="0">
+                <a:solidFill>
+                  <a:srgbClr val="0000FF"/>
+                </a:solidFill>
+              </a:rPr>
+              <a:t>b</a:t>
+            </a:r>
+          </a:p>
+          <a:p>
+            <a:pPr>
+              <a:buFontTx/>
+              <a:buNone/>
+            </a:pPr>
+            <a:r>
+              <a:rPr lang="en-US" sz="4800" dirty="0" smtClean="0">
+                <a:solidFill>
+                  <a:srgbClr val="0000FF"/>
+                </a:solidFill>
+              </a:rPr>
+              <a:t>f</a:t>
+            </a:r>
+            <a:r>
+              <a:rPr lang="en-US" sz="4800" dirty="0" smtClean="0"/>
+              <a:t>(</a:t>
+            </a:r>
+            <a:r>
+              <a:rPr lang="en-US" sz="4800" dirty="0" err="1" smtClean="0">
+                <a:solidFill>
+                  <a:srgbClr val="0000FF"/>
+                </a:solidFill>
+              </a:rPr>
+              <a:t>cnstr</a:t>
+            </a:r>
+            <a:r>
+              <a:rPr lang="en-US" sz="4800" dirty="0" smtClean="0"/>
+              <a:t>(</a:t>
+            </a:r>
+            <a:r>
+              <a:rPr lang="en-US" sz="4800" dirty="0" smtClean="0">
+                <a:solidFill>
+                  <a:srgbClr val="0000FF"/>
+                </a:solidFill>
+              </a:rPr>
+              <a:t>x</a:t>
+            </a:r>
+            <a:r>
+              <a:rPr lang="en-US" sz="4800" dirty="0" smtClean="0"/>
+              <a:t>)) </a:t>
+            </a:r>
+            <a:r>
+              <a:rPr lang="en-US" sz="4800" dirty="0" err="1" smtClean="0"/>
+              <a:t>def’d</a:t>
+            </a:r>
+            <a:r>
+              <a:rPr lang="en-US" sz="4800" dirty="0" smtClean="0"/>
+              <a:t> using </a:t>
+            </a:r>
+            <a:r>
+              <a:rPr lang="en-US" sz="4800" dirty="0" smtClean="0">
+                <a:solidFill>
+                  <a:srgbClr val="0000FF"/>
+                </a:solidFill>
+              </a:rPr>
+              <a:t>f</a:t>
+            </a:r>
+            <a:r>
+              <a:rPr lang="en-US" sz="4800" dirty="0" smtClean="0"/>
+              <a:t>(</a:t>
+            </a:r>
+            <a:r>
+              <a:rPr lang="en-US" sz="4800" dirty="0" smtClean="0">
+                <a:solidFill>
+                  <a:srgbClr val="0000FF"/>
+                </a:solidFill>
+              </a:rPr>
+              <a:t>x</a:t>
+            </a:r>
+            <a:r>
+              <a:rPr lang="en-US" sz="4800" dirty="0" smtClean="0"/>
+              <a:t>), </a:t>
+            </a:r>
+            <a:r>
+              <a:rPr lang="en-US" sz="4800" dirty="0" smtClean="0">
+                <a:solidFill>
+                  <a:srgbClr val="0000FF"/>
+                </a:solidFill>
+              </a:rPr>
+              <a:t>x</a:t>
+            </a:r>
+          </a:p>
+        </p:txBody>
+      </p:sp>
+      <p:sp>
+        <p:nvSpPr>
+          <p:cNvPr id="39940" name="Slide Number Placeholder 3"/>
+          <p:cNvSpPr>
+            <a:spLocks noGrp="1"/>
+          </p:cNvSpPr>
+          <p:nvPr>
+            <p:ph type="sldNum" sz="quarter" idx="4"/>
+          </p:nvPr>
+        </p:nvSpPr>
+        <p:spPr bwMode="auto">
+          <a:xfrm>
+            <a:off x="8153400" y="6629399"/>
+            <a:ext cx="990600" cy="228601"/>
+          </a:xfrm>
+          <a:noFill/>
+          <a:ln>
+            <a:miter lim="800000"/>
+            <a:headEnd/>
+            <a:tailEnd/>
+          </a:ln>
+        </p:spPr>
+        <p:txBody>
+          <a:bodyPr wrap="square" numCol="1" anchorCtr="0" compatLnSpc="1">
+            <a:prstTxWarp prst="textNoShape">
+              <a:avLst/>
+            </a:prstTxWarp>
+          </a:bodyPr>
+          <a:lstStyle/>
+          <a:p>
+            <a:r>
+              <a:rPr lang="en-US" dirty="0" smtClean="0"/>
+              <a:t>7W.</a:t>
+            </a:r>
+            <a:fld id="{07EB1CE8-A0AE-4CF6-8B95-C1E0756CCC63}" type="slidenum">
+              <a:rPr lang="en-US" smtClean="0"/>
+              <a:pPr/>
+              <a:t>28</a:t>
+            </a:fld>
+            <a:endParaRPr lang="en-US" dirty="0" smtClean="0"/>
+          </a:p>
+        </p:txBody>
+      </p:sp>
+    </p:spTree>
+  </p:cSld>
+  <p:clrMapOvr>
+    <a:masterClrMapping/>
+  </p:clrMapOvr>
+  <p:transition spd="slow">
+    <p:fade thruBlk="1"/>
+  </p:transition>
+  <p:timing>
+    <p:tnLst>
+      <p:par>
+        <p:cTn id="1" dur="indefinite" restart="never" nodeType="tmRoot">
+          <p:childTnLst>
+            <p:seq concurrent="1" nextAc="seek">
+              <p:cTn id="2" dur="indefinite" nodeType="mainSeq">
+                <p:childTnLst>
+                  <p:par>
+                    <p:cTn id="3" fill="hold">
+                      <p:stCondLst>
+                        <p:cond delay="indefinite"/>
+                      </p:stCondLst>
+                      <p:childTnLst>
+                        <p:par>
+                          <p:cTn id="4" fill="hold">
+                            <p:stCondLst>
+                              <p:cond delay="0"/>
+                            </p:stCondLst>
+                            <p:childTnLst>
+                              <p:par>
+                                <p:cTn id="5" presetID="22" presetClass="entr" presetSubtype="1" fill="hold" grpId="0" nodeType="clickEffect">
+                                  <p:stCondLst>
+                                    <p:cond delay="0"/>
+                                  </p:stCondLst>
+                                  <p:childTnLst>
+                                    <p:set>
+                                      <p:cBhvr>
+                                        <p:cTn id="6" dur="1" fill="hold">
+                                          <p:stCondLst>
+                                            <p:cond delay="0"/>
+                                          </p:stCondLst>
+                                        </p:cTn>
+                                        <p:tgtEl>
+                                          <p:spTgt spid="39939">
+                                            <p:txEl>
+                                              <p:pRg st="1" end="1"/>
+                                            </p:txEl>
+                                          </p:spTgt>
+                                        </p:tgtEl>
+                                        <p:attrNameLst>
+                                          <p:attrName>style.visibility</p:attrName>
+                                        </p:attrNameLst>
+                                      </p:cBhvr>
+                                      <p:to>
+                                        <p:strVal val="visible"/>
+                                      </p:to>
+                                    </p:set>
+                                    <p:animEffect transition="in" filter="wipe(up)">
+                                      <p:cBhvr>
+                                        <p:cTn id="7" dur="1000"/>
+                                        <p:tgtEl>
+                                          <p:spTgt spid="39939">
+                                            <p:txEl>
+                                              <p:pRg st="1" end="1"/>
+                                            </p:txEl>
+                                          </p:spTgt>
+                                        </p:tgtEl>
+                                      </p:cBhvr>
+                                    </p:animEffect>
+                                  </p:childTnLst>
+                                </p:cTn>
+                              </p:par>
+                            </p:childTnLst>
+                          </p:cTn>
+                        </p:par>
+                      </p:childTnLst>
+                    </p:cTn>
+                  </p:par>
+                  <p:par>
+                    <p:cTn id="8" fill="hold">
+                      <p:stCondLst>
+                        <p:cond delay="indefinite"/>
+                      </p:stCondLst>
+                      <p:childTnLst>
+                        <p:par>
+                          <p:cTn id="9" fill="hold">
+                            <p:stCondLst>
+                              <p:cond delay="0"/>
+                            </p:stCondLst>
+                            <p:childTnLst>
+                              <p:par>
+                                <p:cTn id="10" presetID="22" presetClass="entr" presetSubtype="1" fill="hold" grpId="0" nodeType="clickEffect">
+                                  <p:stCondLst>
+                                    <p:cond delay="0"/>
+                                  </p:stCondLst>
+                                  <p:childTnLst>
+                                    <p:set>
+                                      <p:cBhvr>
+                                        <p:cTn id="11" dur="1" fill="hold">
+                                          <p:stCondLst>
+                                            <p:cond delay="0"/>
+                                          </p:stCondLst>
+                                        </p:cTn>
+                                        <p:tgtEl>
+                                          <p:spTgt spid="39939">
+                                            <p:txEl>
+                                              <p:pRg st="2" end="2"/>
+                                            </p:txEl>
+                                          </p:spTgt>
+                                        </p:tgtEl>
+                                        <p:attrNameLst>
+                                          <p:attrName>style.visibility</p:attrName>
+                                        </p:attrNameLst>
+                                      </p:cBhvr>
+                                      <p:to>
+                                        <p:strVal val="visible"/>
+                                      </p:to>
+                                    </p:set>
+                                    <p:animEffect transition="in" filter="wipe(up)">
+                                      <p:cBhvr>
+                                        <p:cTn id="12" dur="1000"/>
+                                        <p:tgtEl>
+                                          <p:spTgt spid="39939">
+                                            <p:txEl>
+                                              <p:pRg st="2" end="2"/>
+                                            </p:txEl>
+                                          </p:spTgt>
+                                        </p:tgtEl>
+                                      </p:cBhvr>
+                                    </p:animEffect>
+                                  </p:childTnLst>
+                                </p:cTn>
+                              </p:par>
+                            </p:childTnLst>
+                          </p:cTn>
+                        </p:par>
+                      </p:childTnLst>
+                    </p:cTn>
+                  </p:par>
+                </p:childTnLst>
+              </p:cTn>
+              <p:prevCondLst>
+                <p:cond evt="onPrev" delay="0">
+                  <p:tgtEl>
+                    <p:sldTgt/>
+                  </p:tgtEl>
+                </p:cond>
+              </p:prevCondLst>
+              <p:nextCondLst>
+                <p:cond evt="onNext" delay="0">
+                  <p:tgtEl>
+                    <p:sldTgt/>
+                  </p:tgtEl>
+                </p:cond>
+              </p:nextCondLst>
+            </p:seq>
+          </p:childTnLst>
+        </p:cTn>
+      </p:par>
+    </p:tnLst>
+    <p:bldLst>
+      <p:bldP spid="39939" grpId="0" build="p"/>
+    </p:bldLst>
   </p:timing>
 </p:sld>
 </file>

</xml_diff>

<commit_message>
trivial edits: slides7w, MQ_stamps_state_machine
</commit_message>
<xml_diff>
--- a/restricted/slides7w.pptx
+++ b/restricted/slides7w.pptx
@@ -45185,7 +45185,11 @@
           <a:p>
             <a:r>
               <a:rPr lang="en-US" sz="4800" dirty="0" smtClean="0"/>
-              <a:t>loggy(16) = loggy(4</a:t>
+              <a:t>loggy(16) = loggy</a:t>
+            </a:r>
+            <a:r>
+              <a:rPr lang="en-US" sz="4800" dirty="0" smtClean="0"/>
+              <a:t>(2</a:t>
             </a:r>
             <a:r>
               <a:rPr lang="en-US" sz="4800" dirty="0" smtClean="0">
@@ -45195,8 +45199,9 @@
             </a:r>
             <a:r>
               <a:rPr lang="en-US" sz="4800" dirty="0" smtClean="0"/>
-              <a:t>4)</a:t>
-            </a:r>
+              <a:t>8)</a:t>
+            </a:r>
+            <a:endParaRPr lang="en-US" sz="4800" dirty="0" smtClean="0"/>
           </a:p>
           <a:p>
             <a:pPr>
@@ -45205,16 +45210,37 @@
             </a:pPr>
             <a:r>
               <a:rPr lang="en-US" sz="4800" dirty="0" smtClean="0"/>
-              <a:t>        = 4 + </a:t>
-            </a:r>
-            <a:r>
-              <a:rPr lang="en-US" sz="4800" dirty="0" err="1" smtClean="0"/>
-              <a:t>loggy</a:t>
+              <a:t>        =</a:t>
             </a:r>
             <a:r>
               <a:rPr lang="en-US" sz="4800" dirty="0" smtClean="0"/>
-              <a:t>(4) = 4 + 3        </a:t>
-            </a:r>
+              <a:t> 2 </a:t>
+            </a:r>
+            <a:r>
+              <a:rPr lang="en-US" sz="4800" dirty="0" smtClean="0"/>
+              <a:t>+ loggy</a:t>
+            </a:r>
+            <a:r>
+              <a:rPr lang="en-US" sz="4800" dirty="0" smtClean="0"/>
+              <a:t>(8) </a:t>
+            </a:r>
+            <a:r>
+              <a:rPr lang="en-US" sz="4800" dirty="0" smtClean="0"/>
+              <a:t>=</a:t>
+            </a:r>
+            <a:r>
+              <a:rPr lang="en-US" sz="4800" dirty="0" smtClean="0"/>
+              <a:t> 2 </a:t>
+            </a:r>
+            <a:r>
+              <a:rPr lang="en-US" sz="4800" dirty="0" smtClean="0"/>
+              <a:t>+</a:t>
+            </a:r>
+            <a:r>
+              <a:rPr lang="en-US" sz="4800" dirty="0" smtClean="0"/>
+              <a:t> 5        </a:t>
+            </a:r>
+            <a:endParaRPr lang="en-US" sz="4800" dirty="0" smtClean="0"/>
           </a:p>
           <a:p>
             <a:pPr>
@@ -46017,8 +46043,8 @@
         </p:nvSpPr>
         <p:spPr>
           <a:xfrm>
-            <a:off x="190500" y="1219200"/>
-            <a:ext cx="8953500" cy="5329237"/>
+            <a:off x="190500" y="914400"/>
+            <a:ext cx="8801100" cy="5181600"/>
           </a:xfrm>
         </p:spPr>
         <p:txBody>
@@ -46105,16 +46131,13 @@
           <a:p>
             <a:r>
               <a:rPr lang="en-US" dirty="0" smtClean="0"/>
-              <a:t>     16 =  </a:t>
-            </a:r>
-            <a:r>
-              <a:rPr lang="en-US" dirty="0" err="1" smtClean="0"/>
-              <a:t>cnstrct</a:t>
+              <a:t>     16 =  cnstrct</a:t>
             </a:r>
             <a:r>
               <a:rPr lang="en-US" dirty="0" smtClean="0"/>
-              <a:t>(4,4)</a:t>
-            </a:r>
+              <a:t>(2,8)</a:t>
+            </a:r>
+            <a:endParaRPr lang="en-US" dirty="0" smtClean="0"/>
           </a:p>
           <a:p>
             <a:pPr algn="ctr">

</xml_diff>